<commit_message>
Add PowerPoint outline and update presentation
Added 'dan y.txt' containing a detailed PowerPoint outline for a Sentiment Analysis project using DistilBERT. Updated 'Sentiment_Analysis.pptx' to reflect the new outline and project structure.
</commit_message>
<xml_diff>
--- a/Sentiment_Analysis.pptx
+++ b/Sentiment_Analysis.pptx
@@ -5,7 +5,7 @@
     <p:sldMasterId id="2147483648" r:id="rId1"/>
   </p:sldMasterIdLst>
   <p:notesMasterIdLst>
-    <p:notesMasterId r:id="rId15"/>
+    <p:notesMasterId r:id="rId17"/>
   </p:notesMasterIdLst>
   <p:sldIdLst>
     <p:sldId id="256" r:id="rId2"/>
@@ -13,14 +13,16 @@
     <p:sldId id="257" r:id="rId4"/>
     <p:sldId id="259" r:id="rId5"/>
     <p:sldId id="260" r:id="rId6"/>
-    <p:sldId id="261" r:id="rId7"/>
-    <p:sldId id="262" r:id="rId8"/>
-    <p:sldId id="263" r:id="rId9"/>
-    <p:sldId id="264" r:id="rId10"/>
-    <p:sldId id="275" r:id="rId11"/>
-    <p:sldId id="276" r:id="rId12"/>
-    <p:sldId id="277" r:id="rId13"/>
-    <p:sldId id="274" r:id="rId14"/>
+    <p:sldId id="279" r:id="rId7"/>
+    <p:sldId id="261" r:id="rId8"/>
+    <p:sldId id="262" r:id="rId9"/>
+    <p:sldId id="263" r:id="rId10"/>
+    <p:sldId id="264" r:id="rId11"/>
+    <p:sldId id="278" r:id="rId12"/>
+    <p:sldId id="275" r:id="rId13"/>
+    <p:sldId id="276" r:id="rId14"/>
+    <p:sldId id="277" r:id="rId15"/>
+    <p:sldId id="274" r:id="rId16"/>
   </p:sldIdLst>
   <p:sldSz cx="12192000" cy="6858000"/>
   <p:notesSz cx="6858000" cy="9144000"/>
@@ -258,7 +260,7 @@
       <p15:sldGuideLst xmlns:p15="http://schemas.microsoft.com/office/powerpoint/2012/main"/>
     </p:ext>
     <p:ext uri="http://customooxmlschemas.google.com/">
-      <go:slidesCustomData xmlns:go="http://customooxmlschemas.google.com/" xmlns:ahyp="http://schemas.microsoft.com/office/drawing/2018/hyperlinkcolor" xmlns:p15="http://schemas.microsoft.com/office/powerpoint/2012/main" xmlns:p14="http://schemas.microsoft.com/office/powerpoint/2010/main" xmlns:com="http://schemas.openxmlformats.org/drawingml/2006/compatibility" xmlns:pvml="urn:schemas-microsoft-com:office:powerpoint" xmlns:v="urn:schemas-microsoft-com:vml" xmlns:o="urn:schemas-microsoft-com:office:office" xmlns:dgm="http://schemas.openxmlformats.org/drawingml/2006/diagram" xmlns:c="http://schemas.openxmlformats.org/drawingml/2006/chart" xmlns:mv="urn:schemas-microsoft-com:mac:vml" xmlns:mc="http://schemas.openxmlformats.org/markup-compatibility/2006" xmlns="" r:id="rId18" roundtripDataSignature="AMtx7mjBxxPadxrnWgd4bC4ImwqbkGG8fw=="/>
+      <go:slidesCustomData xmlns="" xmlns:mc="http://schemas.openxmlformats.org/markup-compatibility/2006" xmlns:mv="urn:schemas-microsoft-com:mac:vml" xmlns:c="http://schemas.openxmlformats.org/drawingml/2006/chart" xmlns:dgm="http://schemas.openxmlformats.org/drawingml/2006/diagram" xmlns:o="urn:schemas-microsoft-com:office:office" xmlns:v="urn:schemas-microsoft-com:vml" xmlns:pvml="urn:schemas-microsoft-com:office:powerpoint" xmlns:com="http://schemas.openxmlformats.org/drawingml/2006/compatibility" xmlns:p14="http://schemas.microsoft.com/office/powerpoint/2010/main" xmlns:p15="http://schemas.microsoft.com/office/powerpoint/2012/main" xmlns:ahyp="http://schemas.microsoft.com/office/drawing/2018/hyperlinkcolor" xmlns:go="http://customooxmlschemas.google.com/" r:id="rId18" roundtripDataSignature="AMtx7mjBxxPadxrnWgd4bC4ImwqbkGG8fw=="/>
     </p:ext>
   </p:extLst>
 </p:presentation>
@@ -5156,6 +5158,260 @@
         <p:cNvPr id="1" name="Shape 87">
           <a:extLst>
             <a:ext uri="{FF2B5EF4-FFF2-40B4-BE49-F238E27FC236}">
+              <a16:creationId xmlns:a16="http://schemas.microsoft.com/office/drawing/2014/main" id="{81F6E98D-B30C-2C5C-8392-13D417D37E33}"/>
+            </a:ext>
+          </a:extLst>
+        </p:cNvPr>
+        <p:cNvGrpSpPr/>
+        <p:nvPr/>
+      </p:nvGrpSpPr>
+      <p:grpSpPr>
+        <a:xfrm>
+          <a:off x="0" y="0"/>
+          <a:ext cx="0" cy="0"/>
+          <a:chOff x="0" y="0"/>
+          <a:chExt cx="0" cy="0"/>
+        </a:xfrm>
+      </p:grpSpPr>
+      <p:sp>
+        <p:nvSpPr>
+          <p:cNvPr id="88" name="Google Shape;88;p2:notes">
+            <a:extLst>
+              <a:ext uri="{FF2B5EF4-FFF2-40B4-BE49-F238E27FC236}">
+                <a16:creationId xmlns:a16="http://schemas.microsoft.com/office/drawing/2014/main" id="{69FB911E-8136-F273-166B-FECEBCD9AA09}"/>
+              </a:ext>
+            </a:extLst>
+          </p:cNvPr>
+          <p:cNvSpPr txBox="1">
+            <a:spLocks noGrp="1"/>
+          </p:cNvSpPr>
+          <p:nvPr>
+            <p:ph type="body" idx="1"/>
+          </p:nvPr>
+        </p:nvSpPr>
+        <p:spPr>
+          <a:xfrm>
+            <a:off x="685800" y="4343400"/>
+            <a:ext cx="5486400" cy="4114800"/>
+          </a:xfrm>
+          <a:prstGeom prst="rect">
+            <a:avLst/>
+          </a:prstGeom>
+        </p:spPr>
+        <p:txBody>
+          <a:bodyPr spcFirstLastPara="1" wrap="square" lIns="91425" tIns="91425" rIns="91425" bIns="91425" anchor="t" anchorCtr="0">
+            <a:noAutofit/>
+          </a:bodyPr>
+          <a:lstStyle/>
+          <a:p>
+            <a:pPr marL="0" lvl="0" indent="0" algn="l" rtl="0">
+              <a:spcBef>
+                <a:spcPts val="0"/>
+              </a:spcBef>
+              <a:spcAft>
+                <a:spcPts val="0"/>
+              </a:spcAft>
+              <a:buNone/>
+            </a:pPr>
+            <a:endParaRPr/>
+          </a:p>
+        </p:txBody>
+      </p:sp>
+      <p:sp>
+        <p:nvSpPr>
+          <p:cNvPr id="89" name="Google Shape;89;p2:notes">
+            <a:extLst>
+              <a:ext uri="{FF2B5EF4-FFF2-40B4-BE49-F238E27FC236}">
+                <a16:creationId xmlns:a16="http://schemas.microsoft.com/office/drawing/2014/main" id="{541AE969-F27A-8303-58F9-1A241FDBD88F}"/>
+              </a:ext>
+            </a:extLst>
+          </p:cNvPr>
+          <p:cNvSpPr>
+            <a:spLocks noGrp="1" noRot="1" noChangeAspect="1"/>
+          </p:cNvSpPr>
+          <p:nvPr>
+            <p:ph type="sldImg" idx="2"/>
+          </p:nvPr>
+        </p:nvSpPr>
+        <p:spPr>
+          <a:xfrm>
+            <a:off x="381000" y="685800"/>
+            <a:ext cx="6096000" cy="3429000"/>
+          </a:xfrm>
+          <a:custGeom>
+            <a:avLst/>
+            <a:gdLst/>
+            <a:ahLst/>
+            <a:cxnLst/>
+            <a:rect l="l" t="t" r="r" b="b"/>
+            <a:pathLst>
+              <a:path w="120000" h="120000" extrusionOk="0">
+                <a:moveTo>
+                  <a:pt x="0" y="0"/>
+                </a:moveTo>
+                <a:lnTo>
+                  <a:pt x="120000" y="0"/>
+                </a:lnTo>
+                <a:lnTo>
+                  <a:pt x="120000" y="120000"/>
+                </a:lnTo>
+                <a:lnTo>
+                  <a:pt x="0" y="120000"/>
+                </a:lnTo>
+                <a:close/>
+              </a:path>
+            </a:pathLst>
+          </a:custGeom>
+        </p:spPr>
+      </p:sp>
+    </p:spTree>
+    <p:extLst>
+      <p:ext uri="{BB962C8B-B14F-4D97-AF65-F5344CB8AC3E}">
+        <p14:creationId xmlns:p14="http://schemas.microsoft.com/office/powerpoint/2010/main" val="2723931729"/>
+      </p:ext>
+    </p:extLst>
+  </p:cSld>
+  <p:clrMapOvr>
+    <a:masterClrMapping/>
+  </p:clrMapOvr>
+</p:notes>
+</file>
+
+<file path=ppt/notesSlides/notesSlide11.xml><?xml version="1.0" encoding="utf-8"?>
+<p:notes xmlns:a="http://schemas.openxmlformats.org/drawingml/2006/main" xmlns:r="http://schemas.openxmlformats.org/officeDocument/2006/relationships" xmlns:p="http://schemas.openxmlformats.org/presentationml/2006/main" showMasterSp="0" showMasterPhAnim="0">
+  <p:cSld>
+    <p:spTree>
+      <p:nvGrpSpPr>
+        <p:cNvPr id="1" name="Shape 87">
+          <a:extLst>
+            <a:ext uri="{FF2B5EF4-FFF2-40B4-BE49-F238E27FC236}">
+              <a16:creationId xmlns:a16="http://schemas.microsoft.com/office/drawing/2014/main" id="{81F6E98D-B30C-2C5C-8392-13D417D37E33}"/>
+            </a:ext>
+          </a:extLst>
+        </p:cNvPr>
+        <p:cNvGrpSpPr/>
+        <p:nvPr/>
+      </p:nvGrpSpPr>
+      <p:grpSpPr>
+        <a:xfrm>
+          <a:off x="0" y="0"/>
+          <a:ext cx="0" cy="0"/>
+          <a:chOff x="0" y="0"/>
+          <a:chExt cx="0" cy="0"/>
+        </a:xfrm>
+      </p:grpSpPr>
+      <p:sp>
+        <p:nvSpPr>
+          <p:cNvPr id="88" name="Google Shape;88;p2:notes">
+            <a:extLst>
+              <a:ext uri="{FF2B5EF4-FFF2-40B4-BE49-F238E27FC236}">
+                <a16:creationId xmlns:a16="http://schemas.microsoft.com/office/drawing/2014/main" id="{69FB911E-8136-F273-166B-FECEBCD9AA09}"/>
+              </a:ext>
+            </a:extLst>
+          </p:cNvPr>
+          <p:cNvSpPr txBox="1">
+            <a:spLocks noGrp="1"/>
+          </p:cNvSpPr>
+          <p:nvPr>
+            <p:ph type="body" idx="1"/>
+          </p:nvPr>
+        </p:nvSpPr>
+        <p:spPr>
+          <a:xfrm>
+            <a:off x="685800" y="4343400"/>
+            <a:ext cx="5486400" cy="4114800"/>
+          </a:xfrm>
+          <a:prstGeom prst="rect">
+            <a:avLst/>
+          </a:prstGeom>
+        </p:spPr>
+        <p:txBody>
+          <a:bodyPr spcFirstLastPara="1" wrap="square" lIns="91425" tIns="91425" rIns="91425" bIns="91425" anchor="t" anchorCtr="0">
+            <a:noAutofit/>
+          </a:bodyPr>
+          <a:lstStyle/>
+          <a:p>
+            <a:pPr marL="0" lvl="0" indent="0" algn="l" rtl="0">
+              <a:spcBef>
+                <a:spcPts val="0"/>
+              </a:spcBef>
+              <a:spcAft>
+                <a:spcPts val="0"/>
+              </a:spcAft>
+              <a:buNone/>
+            </a:pPr>
+            <a:endParaRPr/>
+          </a:p>
+        </p:txBody>
+      </p:sp>
+      <p:sp>
+        <p:nvSpPr>
+          <p:cNvPr id="89" name="Google Shape;89;p2:notes">
+            <a:extLst>
+              <a:ext uri="{FF2B5EF4-FFF2-40B4-BE49-F238E27FC236}">
+                <a16:creationId xmlns:a16="http://schemas.microsoft.com/office/drawing/2014/main" id="{541AE969-F27A-8303-58F9-1A241FDBD88F}"/>
+              </a:ext>
+            </a:extLst>
+          </p:cNvPr>
+          <p:cNvSpPr>
+            <a:spLocks noGrp="1" noRot="1" noChangeAspect="1"/>
+          </p:cNvSpPr>
+          <p:nvPr>
+            <p:ph type="sldImg" idx="2"/>
+          </p:nvPr>
+        </p:nvSpPr>
+        <p:spPr>
+          <a:xfrm>
+            <a:off x="381000" y="685800"/>
+            <a:ext cx="6096000" cy="3429000"/>
+          </a:xfrm>
+          <a:custGeom>
+            <a:avLst/>
+            <a:gdLst/>
+            <a:ahLst/>
+            <a:cxnLst/>
+            <a:rect l="l" t="t" r="r" b="b"/>
+            <a:pathLst>
+              <a:path w="120000" h="120000" extrusionOk="0">
+                <a:moveTo>
+                  <a:pt x="0" y="0"/>
+                </a:moveTo>
+                <a:lnTo>
+                  <a:pt x="120000" y="0"/>
+                </a:lnTo>
+                <a:lnTo>
+                  <a:pt x="120000" y="120000"/>
+                </a:lnTo>
+                <a:lnTo>
+                  <a:pt x="0" y="120000"/>
+                </a:lnTo>
+                <a:close/>
+              </a:path>
+            </a:pathLst>
+          </a:custGeom>
+        </p:spPr>
+      </p:sp>
+    </p:spTree>
+    <p:extLst>
+      <p:ext uri="{BB962C8B-B14F-4D97-AF65-F5344CB8AC3E}">
+        <p14:creationId xmlns:p14="http://schemas.microsoft.com/office/powerpoint/2010/main" val="2031432827"/>
+      </p:ext>
+    </p:extLst>
+  </p:cSld>
+  <p:clrMapOvr>
+    <a:masterClrMapping/>
+  </p:clrMapOvr>
+</p:notes>
+</file>
+
+<file path=ppt/notesSlides/notesSlide12.xml><?xml version="1.0" encoding="utf-8"?>
+<p:notes xmlns:a="http://schemas.openxmlformats.org/drawingml/2006/main" xmlns:r="http://schemas.openxmlformats.org/officeDocument/2006/relationships" xmlns:p="http://schemas.openxmlformats.org/presentationml/2006/main" showMasterSp="0" showMasterPhAnim="0">
+  <p:cSld>
+    <p:spTree>
+      <p:nvGrpSpPr>
+        <p:cNvPr id="1" name="Shape 87">
+          <a:extLst>
+            <a:ext uri="{FF2B5EF4-FFF2-40B4-BE49-F238E27FC236}">
               <a16:creationId xmlns:a16="http://schemas.microsoft.com/office/drawing/2014/main" id="{D0EC3418-4AB6-0821-9B85-53AF4F9DFC7B}"/>
             </a:ext>
           </a:extLst>
@@ -5275,7 +5531,7 @@
 </p:notes>
 </file>
 
-<file path=ppt/notesSlides/notesSlide11.xml><?xml version="1.0" encoding="utf-8"?>
+<file path=ppt/notesSlides/notesSlide13.xml><?xml version="1.0" encoding="utf-8"?>
 <p:notes xmlns:a="http://schemas.openxmlformats.org/drawingml/2006/main" xmlns:r="http://schemas.openxmlformats.org/officeDocument/2006/relationships" xmlns:p="http://schemas.openxmlformats.org/presentationml/2006/main" showMasterSp="0" showMasterPhAnim="0">
   <p:cSld>
     <p:spTree>
@@ -5402,7 +5658,7 @@
 </p:notes>
 </file>
 
-<file path=ppt/notesSlides/notesSlide12.xml><?xml version="1.0" encoding="utf-8"?>
+<file path=ppt/notesSlides/notesSlide14.xml><?xml version="1.0" encoding="utf-8"?>
 <p:notes xmlns:a="http://schemas.openxmlformats.org/drawingml/2006/main" xmlns:r="http://schemas.openxmlformats.org/officeDocument/2006/relationships" xmlns:p="http://schemas.openxmlformats.org/presentationml/2006/main" showMasterSp="0" showMasterPhAnim="0">
   <p:cSld>
     <p:spTree>
@@ -5999,6 +6255,133 @@
         <p:cNvPr id="1" name="Shape 87">
           <a:extLst>
             <a:ext uri="{FF2B5EF4-FFF2-40B4-BE49-F238E27FC236}">
+              <a16:creationId xmlns:a16="http://schemas.microsoft.com/office/drawing/2014/main" id="{0820512B-F6A0-271D-B89B-4902D8107A54}"/>
+            </a:ext>
+          </a:extLst>
+        </p:cNvPr>
+        <p:cNvGrpSpPr/>
+        <p:nvPr/>
+      </p:nvGrpSpPr>
+      <p:grpSpPr>
+        <a:xfrm>
+          <a:off x="0" y="0"/>
+          <a:ext cx="0" cy="0"/>
+          <a:chOff x="0" y="0"/>
+          <a:chExt cx="0" cy="0"/>
+        </a:xfrm>
+      </p:grpSpPr>
+      <p:sp>
+        <p:nvSpPr>
+          <p:cNvPr id="88" name="Google Shape;88;p2:notes">
+            <a:extLst>
+              <a:ext uri="{FF2B5EF4-FFF2-40B4-BE49-F238E27FC236}">
+                <a16:creationId xmlns:a16="http://schemas.microsoft.com/office/drawing/2014/main" id="{537F8CBA-DBE9-91BB-968D-6BD6BE00ADCB}"/>
+              </a:ext>
+            </a:extLst>
+          </p:cNvPr>
+          <p:cNvSpPr txBox="1">
+            <a:spLocks noGrp="1"/>
+          </p:cNvSpPr>
+          <p:nvPr>
+            <p:ph type="body" idx="1"/>
+          </p:nvPr>
+        </p:nvSpPr>
+        <p:spPr>
+          <a:xfrm>
+            <a:off x="685800" y="4343400"/>
+            <a:ext cx="5486400" cy="4114800"/>
+          </a:xfrm>
+          <a:prstGeom prst="rect">
+            <a:avLst/>
+          </a:prstGeom>
+        </p:spPr>
+        <p:txBody>
+          <a:bodyPr spcFirstLastPara="1" wrap="square" lIns="91425" tIns="91425" rIns="91425" bIns="91425" anchor="t" anchorCtr="0">
+            <a:noAutofit/>
+          </a:bodyPr>
+          <a:lstStyle/>
+          <a:p>
+            <a:pPr marL="0" lvl="0" indent="0" algn="l" rtl="0">
+              <a:spcBef>
+                <a:spcPts val="0"/>
+              </a:spcBef>
+              <a:spcAft>
+                <a:spcPts val="0"/>
+              </a:spcAft>
+              <a:buNone/>
+            </a:pPr>
+            <a:endParaRPr/>
+          </a:p>
+        </p:txBody>
+      </p:sp>
+      <p:sp>
+        <p:nvSpPr>
+          <p:cNvPr id="89" name="Google Shape;89;p2:notes">
+            <a:extLst>
+              <a:ext uri="{FF2B5EF4-FFF2-40B4-BE49-F238E27FC236}">
+                <a16:creationId xmlns:a16="http://schemas.microsoft.com/office/drawing/2014/main" id="{D9DBA569-7DE5-B5F0-3DEC-A1A5A19F72F5}"/>
+              </a:ext>
+            </a:extLst>
+          </p:cNvPr>
+          <p:cNvSpPr>
+            <a:spLocks noGrp="1" noRot="1" noChangeAspect="1"/>
+          </p:cNvSpPr>
+          <p:nvPr>
+            <p:ph type="sldImg" idx="2"/>
+          </p:nvPr>
+        </p:nvSpPr>
+        <p:spPr>
+          <a:xfrm>
+            <a:off x="381000" y="685800"/>
+            <a:ext cx="6096000" cy="3429000"/>
+          </a:xfrm>
+          <a:custGeom>
+            <a:avLst/>
+            <a:gdLst/>
+            <a:ahLst/>
+            <a:cxnLst/>
+            <a:rect l="l" t="t" r="r" b="b"/>
+            <a:pathLst>
+              <a:path w="120000" h="120000" extrusionOk="0">
+                <a:moveTo>
+                  <a:pt x="0" y="0"/>
+                </a:moveTo>
+                <a:lnTo>
+                  <a:pt x="120000" y="0"/>
+                </a:lnTo>
+                <a:lnTo>
+                  <a:pt x="120000" y="120000"/>
+                </a:lnTo>
+                <a:lnTo>
+                  <a:pt x="0" y="120000"/>
+                </a:lnTo>
+                <a:close/>
+              </a:path>
+            </a:pathLst>
+          </a:custGeom>
+        </p:spPr>
+      </p:sp>
+    </p:spTree>
+    <p:extLst>
+      <p:ext uri="{BB962C8B-B14F-4D97-AF65-F5344CB8AC3E}">
+        <p14:creationId xmlns:p14="http://schemas.microsoft.com/office/powerpoint/2010/main" val="1160771251"/>
+      </p:ext>
+    </p:extLst>
+  </p:cSld>
+  <p:clrMapOvr>
+    <a:masterClrMapping/>
+  </p:clrMapOvr>
+</p:notes>
+</file>
+
+<file path=ppt/notesSlides/notesSlide7.xml><?xml version="1.0" encoding="utf-8"?>
+<p:notes xmlns:a="http://schemas.openxmlformats.org/drawingml/2006/main" xmlns:r="http://schemas.openxmlformats.org/officeDocument/2006/relationships" xmlns:p="http://schemas.openxmlformats.org/presentationml/2006/main" showMasterSp="0" showMasterPhAnim="0">
+  <p:cSld>
+    <p:spTree>
+      <p:nvGrpSpPr>
+        <p:cNvPr id="1" name="Shape 87">
+          <a:extLst>
+            <a:ext uri="{FF2B5EF4-FFF2-40B4-BE49-F238E27FC236}">
               <a16:creationId xmlns:a16="http://schemas.microsoft.com/office/drawing/2014/main" id="{E5DF69E5-BC6D-8A01-CA56-CD0CFF224496}"/>
             </a:ext>
           </a:extLst>
@@ -6118,7 +6501,7 @@
 </p:notes>
 </file>
 
-<file path=ppt/notesSlides/notesSlide7.xml><?xml version="1.0" encoding="utf-8"?>
+<file path=ppt/notesSlides/notesSlide8.xml><?xml version="1.0" encoding="utf-8"?>
 <p:notes xmlns:a="http://schemas.openxmlformats.org/drawingml/2006/main" xmlns:r="http://schemas.openxmlformats.org/officeDocument/2006/relationships" xmlns:p="http://schemas.openxmlformats.org/presentationml/2006/main" showMasterSp="0" showMasterPhAnim="0">
   <p:cSld>
     <p:spTree>
@@ -6245,7 +6628,7 @@
 </p:notes>
 </file>
 
-<file path=ppt/notesSlides/notesSlide8.xml><?xml version="1.0" encoding="utf-8"?>
+<file path=ppt/notesSlides/notesSlide9.xml><?xml version="1.0" encoding="utf-8"?>
 <p:notes xmlns:a="http://schemas.openxmlformats.org/drawingml/2006/main" xmlns:r="http://schemas.openxmlformats.org/officeDocument/2006/relationships" xmlns:p="http://schemas.openxmlformats.org/presentationml/2006/main" showMasterSp="0" showMasterPhAnim="0">
   <p:cSld>
     <p:spTree>
@@ -6363,133 +6746,6 @@
     <p:extLst>
       <p:ext uri="{BB962C8B-B14F-4D97-AF65-F5344CB8AC3E}">
         <p14:creationId xmlns:p14="http://schemas.microsoft.com/office/powerpoint/2010/main" val="1053299816"/>
-      </p:ext>
-    </p:extLst>
-  </p:cSld>
-  <p:clrMapOvr>
-    <a:masterClrMapping/>
-  </p:clrMapOvr>
-</p:notes>
-</file>
-
-<file path=ppt/notesSlides/notesSlide9.xml><?xml version="1.0" encoding="utf-8"?>
-<p:notes xmlns:a="http://schemas.openxmlformats.org/drawingml/2006/main" xmlns:r="http://schemas.openxmlformats.org/officeDocument/2006/relationships" xmlns:p="http://schemas.openxmlformats.org/presentationml/2006/main" showMasterSp="0" showMasterPhAnim="0">
-  <p:cSld>
-    <p:spTree>
-      <p:nvGrpSpPr>
-        <p:cNvPr id="1" name="Shape 87">
-          <a:extLst>
-            <a:ext uri="{FF2B5EF4-FFF2-40B4-BE49-F238E27FC236}">
-              <a16:creationId xmlns:a16="http://schemas.microsoft.com/office/drawing/2014/main" id="{81F6E98D-B30C-2C5C-8392-13D417D37E33}"/>
-            </a:ext>
-          </a:extLst>
-        </p:cNvPr>
-        <p:cNvGrpSpPr/>
-        <p:nvPr/>
-      </p:nvGrpSpPr>
-      <p:grpSpPr>
-        <a:xfrm>
-          <a:off x="0" y="0"/>
-          <a:ext cx="0" cy="0"/>
-          <a:chOff x="0" y="0"/>
-          <a:chExt cx="0" cy="0"/>
-        </a:xfrm>
-      </p:grpSpPr>
-      <p:sp>
-        <p:nvSpPr>
-          <p:cNvPr id="88" name="Google Shape;88;p2:notes">
-            <a:extLst>
-              <a:ext uri="{FF2B5EF4-FFF2-40B4-BE49-F238E27FC236}">
-                <a16:creationId xmlns:a16="http://schemas.microsoft.com/office/drawing/2014/main" id="{69FB911E-8136-F273-166B-FECEBCD9AA09}"/>
-              </a:ext>
-            </a:extLst>
-          </p:cNvPr>
-          <p:cNvSpPr txBox="1">
-            <a:spLocks noGrp="1"/>
-          </p:cNvSpPr>
-          <p:nvPr>
-            <p:ph type="body" idx="1"/>
-          </p:nvPr>
-        </p:nvSpPr>
-        <p:spPr>
-          <a:xfrm>
-            <a:off x="685800" y="4343400"/>
-            <a:ext cx="5486400" cy="4114800"/>
-          </a:xfrm>
-          <a:prstGeom prst="rect">
-            <a:avLst/>
-          </a:prstGeom>
-        </p:spPr>
-        <p:txBody>
-          <a:bodyPr spcFirstLastPara="1" wrap="square" lIns="91425" tIns="91425" rIns="91425" bIns="91425" anchor="t" anchorCtr="0">
-            <a:noAutofit/>
-          </a:bodyPr>
-          <a:lstStyle/>
-          <a:p>
-            <a:pPr marL="0" lvl="0" indent="0" algn="l" rtl="0">
-              <a:spcBef>
-                <a:spcPts val="0"/>
-              </a:spcBef>
-              <a:spcAft>
-                <a:spcPts val="0"/>
-              </a:spcAft>
-              <a:buNone/>
-            </a:pPr>
-            <a:endParaRPr/>
-          </a:p>
-        </p:txBody>
-      </p:sp>
-      <p:sp>
-        <p:nvSpPr>
-          <p:cNvPr id="89" name="Google Shape;89;p2:notes">
-            <a:extLst>
-              <a:ext uri="{FF2B5EF4-FFF2-40B4-BE49-F238E27FC236}">
-                <a16:creationId xmlns:a16="http://schemas.microsoft.com/office/drawing/2014/main" id="{541AE969-F27A-8303-58F9-1A241FDBD88F}"/>
-              </a:ext>
-            </a:extLst>
-          </p:cNvPr>
-          <p:cNvSpPr>
-            <a:spLocks noGrp="1" noRot="1" noChangeAspect="1"/>
-          </p:cNvSpPr>
-          <p:nvPr>
-            <p:ph type="sldImg" idx="2"/>
-          </p:nvPr>
-        </p:nvSpPr>
-        <p:spPr>
-          <a:xfrm>
-            <a:off x="381000" y="685800"/>
-            <a:ext cx="6096000" cy="3429000"/>
-          </a:xfrm>
-          <a:custGeom>
-            <a:avLst/>
-            <a:gdLst/>
-            <a:ahLst/>
-            <a:cxnLst/>
-            <a:rect l="l" t="t" r="r" b="b"/>
-            <a:pathLst>
-              <a:path w="120000" h="120000" extrusionOk="0">
-                <a:moveTo>
-                  <a:pt x="0" y="0"/>
-                </a:moveTo>
-                <a:lnTo>
-                  <a:pt x="120000" y="0"/>
-                </a:lnTo>
-                <a:lnTo>
-                  <a:pt x="120000" y="120000"/>
-                </a:lnTo>
-                <a:lnTo>
-                  <a:pt x="0" y="120000"/>
-                </a:lnTo>
-                <a:close/>
-              </a:path>
-            </a:pathLst>
-          </a:custGeom>
-        </p:spPr>
-      </p:sp>
-    </p:spTree>
-    <p:extLst>
-      <p:ext uri="{BB962C8B-B14F-4D97-AF65-F5344CB8AC3E}">
-        <p14:creationId xmlns:p14="http://schemas.microsoft.com/office/powerpoint/2010/main" val="2723931729"/>
       </p:ext>
     </p:extLst>
   </p:cSld>
@@ -17060,6 +17316,280 @@
         <p:cNvPr id="1" name="Shape 90">
           <a:extLst>
             <a:ext uri="{FF2B5EF4-FFF2-40B4-BE49-F238E27FC236}">
+              <a16:creationId xmlns:a16="http://schemas.microsoft.com/office/drawing/2014/main" id="{96933A31-685C-6947-68BE-E02DA179DB8D}"/>
+            </a:ext>
+          </a:extLst>
+        </p:cNvPr>
+        <p:cNvGrpSpPr/>
+        <p:nvPr/>
+      </p:nvGrpSpPr>
+      <p:grpSpPr>
+        <a:xfrm>
+          <a:off x="0" y="0"/>
+          <a:ext cx="0" cy="0"/>
+          <a:chOff x="0" y="0"/>
+          <a:chExt cx="0" cy="0"/>
+        </a:xfrm>
+      </p:grpSpPr>
+      <p:pic>
+        <p:nvPicPr>
+          <p:cNvPr id="92" name="Google Shape;92;p2">
+            <a:extLst>
+              <a:ext uri="{FF2B5EF4-FFF2-40B4-BE49-F238E27FC236}">
+                <a16:creationId xmlns:a16="http://schemas.microsoft.com/office/drawing/2014/main" id="{211A6BC1-5286-C164-D32F-8A1604AF5302}"/>
+              </a:ext>
+            </a:extLst>
+          </p:cNvPr>
+          <p:cNvPicPr preferRelativeResize="0"/>
+          <p:nvPr/>
+        </p:nvPicPr>
+        <p:blipFill rotWithShape="1">
+          <a:blip r:embed="rId3">
+            <a:alphaModFix/>
+          </a:blip>
+          <a:srcRect/>
+          <a:stretch/>
+        </p:blipFill>
+        <p:spPr>
+          <a:xfrm>
+            <a:off x="0" y="0"/>
+            <a:ext cx="12313325" cy="1255521"/>
+          </a:xfrm>
+          <a:prstGeom prst="rect">
+            <a:avLst/>
+          </a:prstGeom>
+          <a:noFill/>
+          <a:ln>
+            <a:noFill/>
+          </a:ln>
+        </p:spPr>
+      </p:pic>
+      <p:sp>
+        <p:nvSpPr>
+          <p:cNvPr id="3" name="Title 1">
+            <a:extLst>
+              <a:ext uri="{FF2B5EF4-FFF2-40B4-BE49-F238E27FC236}">
+                <a16:creationId xmlns:a16="http://schemas.microsoft.com/office/drawing/2014/main" id="{489EBB6A-0E4C-2649-9615-F84EEC44E65C}"/>
+              </a:ext>
+            </a:extLst>
+          </p:cNvPr>
+          <p:cNvSpPr>
+            <a:spLocks noGrp="1"/>
+          </p:cNvSpPr>
+          <p:nvPr>
+            <p:ph type="title"/>
+          </p:nvPr>
+        </p:nvSpPr>
+        <p:spPr>
+          <a:xfrm>
+            <a:off x="370839" y="1446908"/>
+            <a:ext cx="10515600" cy="552014"/>
+          </a:xfrm>
+        </p:spPr>
+        <p:txBody>
+          <a:bodyPr>
+            <a:normAutofit/>
+          </a:bodyPr>
+          <a:lstStyle/>
+          <a:p>
+            <a:r>
+              <a:rPr lang="en-US" sz="2400" b="1">
+                <a:latin typeface="Times New Roman" panose="02020603050405020304" pitchFamily="18" charset="0"/>
+                <a:cs typeface="Times New Roman" panose="02020603050405020304" pitchFamily="18" charset="0"/>
+              </a:rPr>
+              <a:t>4. Demo</a:t>
+            </a:r>
+          </a:p>
+        </p:txBody>
+      </p:sp>
+      <p:pic>
+        <p:nvPicPr>
+          <p:cNvPr id="4" name="Picture 3">
+            <a:extLst>
+              <a:ext uri="{FF2B5EF4-FFF2-40B4-BE49-F238E27FC236}">
+                <a16:creationId xmlns:a16="http://schemas.microsoft.com/office/drawing/2014/main" id="{EB3EF2C5-595A-A6A8-2F6F-2B0EB4D227EB}"/>
+              </a:ext>
+            </a:extLst>
+          </p:cNvPr>
+          <p:cNvPicPr>
+            <a:picLocks noChangeAspect="1"/>
+          </p:cNvPicPr>
+          <p:nvPr/>
+        </p:nvPicPr>
+        <p:blipFill>
+          <a:blip r:embed="rId4"/>
+          <a:stretch>
+            <a:fillRect/>
+          </a:stretch>
+        </p:blipFill>
+        <p:spPr>
+          <a:xfrm>
+            <a:off x="3215188" y="1616152"/>
+            <a:ext cx="5184533" cy="4894517"/>
+          </a:xfrm>
+          <a:prstGeom prst="rect">
+            <a:avLst/>
+          </a:prstGeom>
+        </p:spPr>
+      </p:pic>
+    </p:spTree>
+    <p:extLst>
+      <p:ext uri="{BB962C8B-B14F-4D97-AF65-F5344CB8AC3E}">
+        <p14:creationId xmlns:p14="http://schemas.microsoft.com/office/powerpoint/2010/main" val="1207278348"/>
+      </p:ext>
+    </p:extLst>
+  </p:cSld>
+  <p:clrMapOvr>
+    <a:masterClrMapping/>
+  </p:clrMapOvr>
+</p:sld>
+</file>
+
+<file path=ppt/slides/slide11.xml><?xml version="1.0" encoding="utf-8"?>
+<p:sld xmlns:a="http://schemas.openxmlformats.org/drawingml/2006/main" xmlns:r="http://schemas.openxmlformats.org/officeDocument/2006/relationships" xmlns:p="http://schemas.openxmlformats.org/presentationml/2006/main">
+  <p:cSld>
+    <p:spTree>
+      <p:nvGrpSpPr>
+        <p:cNvPr id="1" name="Shape 90">
+          <a:extLst>
+            <a:ext uri="{FF2B5EF4-FFF2-40B4-BE49-F238E27FC236}">
+              <a16:creationId xmlns:a16="http://schemas.microsoft.com/office/drawing/2014/main" id="{96933A31-685C-6947-68BE-E02DA179DB8D}"/>
+            </a:ext>
+          </a:extLst>
+        </p:cNvPr>
+        <p:cNvGrpSpPr/>
+        <p:nvPr/>
+      </p:nvGrpSpPr>
+      <p:grpSpPr>
+        <a:xfrm>
+          <a:off x="0" y="0"/>
+          <a:ext cx="0" cy="0"/>
+          <a:chOff x="0" y="0"/>
+          <a:chExt cx="0" cy="0"/>
+        </a:xfrm>
+      </p:grpSpPr>
+      <p:pic>
+        <p:nvPicPr>
+          <p:cNvPr id="92" name="Google Shape;92;p2">
+            <a:extLst>
+              <a:ext uri="{FF2B5EF4-FFF2-40B4-BE49-F238E27FC236}">
+                <a16:creationId xmlns:a16="http://schemas.microsoft.com/office/drawing/2014/main" id="{211A6BC1-5286-C164-D32F-8A1604AF5302}"/>
+              </a:ext>
+            </a:extLst>
+          </p:cNvPr>
+          <p:cNvPicPr preferRelativeResize="0"/>
+          <p:nvPr/>
+        </p:nvPicPr>
+        <p:blipFill rotWithShape="1">
+          <a:blip r:embed="rId3">
+            <a:alphaModFix/>
+          </a:blip>
+          <a:srcRect/>
+          <a:stretch/>
+        </p:blipFill>
+        <p:spPr>
+          <a:xfrm>
+            <a:off x="0" y="0"/>
+            <a:ext cx="12313325" cy="1255521"/>
+          </a:xfrm>
+          <a:prstGeom prst="rect">
+            <a:avLst/>
+          </a:prstGeom>
+          <a:noFill/>
+          <a:ln>
+            <a:noFill/>
+          </a:ln>
+        </p:spPr>
+      </p:pic>
+      <p:sp>
+        <p:nvSpPr>
+          <p:cNvPr id="3" name="Title 1">
+            <a:extLst>
+              <a:ext uri="{FF2B5EF4-FFF2-40B4-BE49-F238E27FC236}">
+                <a16:creationId xmlns:a16="http://schemas.microsoft.com/office/drawing/2014/main" id="{489EBB6A-0E4C-2649-9615-F84EEC44E65C}"/>
+              </a:ext>
+            </a:extLst>
+          </p:cNvPr>
+          <p:cNvSpPr>
+            <a:spLocks noGrp="1"/>
+          </p:cNvSpPr>
+          <p:nvPr>
+            <p:ph type="title"/>
+          </p:nvPr>
+        </p:nvSpPr>
+        <p:spPr>
+          <a:xfrm>
+            <a:off x="370839" y="1446908"/>
+            <a:ext cx="10515600" cy="552014"/>
+          </a:xfrm>
+        </p:spPr>
+        <p:txBody>
+          <a:bodyPr>
+            <a:normAutofit/>
+          </a:bodyPr>
+          <a:lstStyle/>
+          <a:p>
+            <a:r>
+              <a:rPr lang="en-US" sz="2400" b="1">
+                <a:latin typeface="Times New Roman" panose="02020603050405020304" pitchFamily="18" charset="0"/>
+                <a:cs typeface="Times New Roman" panose="02020603050405020304" pitchFamily="18" charset="0"/>
+              </a:rPr>
+              <a:t>4. Demo</a:t>
+            </a:r>
+          </a:p>
+        </p:txBody>
+      </p:sp>
+      <p:pic>
+        <p:nvPicPr>
+          <p:cNvPr id="5" name="Picture 4">
+            <a:extLst>
+              <a:ext uri="{FF2B5EF4-FFF2-40B4-BE49-F238E27FC236}">
+                <a16:creationId xmlns:a16="http://schemas.microsoft.com/office/drawing/2014/main" id="{BE30EBB8-E20F-89AC-16B0-06DD8BAD5C23}"/>
+              </a:ext>
+            </a:extLst>
+          </p:cNvPr>
+          <p:cNvPicPr>
+            <a:picLocks noChangeAspect="1"/>
+          </p:cNvPicPr>
+          <p:nvPr/>
+        </p:nvPicPr>
+        <p:blipFill>
+          <a:blip r:embed="rId4"/>
+          <a:stretch>
+            <a:fillRect/>
+          </a:stretch>
+        </p:blipFill>
+        <p:spPr>
+          <a:xfrm>
+            <a:off x="1891583" y="2190309"/>
+            <a:ext cx="8408833" cy="3404945"/>
+          </a:xfrm>
+          <a:prstGeom prst="rect">
+            <a:avLst/>
+          </a:prstGeom>
+        </p:spPr>
+      </p:pic>
+    </p:spTree>
+    <p:extLst>
+      <p:ext uri="{BB962C8B-B14F-4D97-AF65-F5344CB8AC3E}">
+        <p14:creationId xmlns:p14="http://schemas.microsoft.com/office/powerpoint/2010/main" val="1179446674"/>
+      </p:ext>
+    </p:extLst>
+  </p:cSld>
+  <p:clrMapOvr>
+    <a:masterClrMapping/>
+  </p:clrMapOvr>
+</p:sld>
+</file>
+
+<file path=ppt/slides/slide12.xml><?xml version="1.0" encoding="utf-8"?>
+<p:sld xmlns:a="http://schemas.openxmlformats.org/drawingml/2006/main" xmlns:r="http://schemas.openxmlformats.org/officeDocument/2006/relationships" xmlns:p="http://schemas.openxmlformats.org/presentationml/2006/main">
+  <p:cSld>
+    <p:spTree>
+      <p:nvGrpSpPr>
+        <p:cNvPr id="1" name="Shape 90">
+          <a:extLst>
+            <a:ext uri="{FF2B5EF4-FFF2-40B4-BE49-F238E27FC236}">
               <a16:creationId xmlns:a16="http://schemas.microsoft.com/office/drawing/2014/main" id="{39FFE989-7F71-7E27-D800-801BF07D2516}"/>
             </a:ext>
           </a:extLst>
@@ -17250,7 +17780,7 @@
 </p:sld>
 </file>
 
-<file path=ppt/slides/slide11.xml><?xml version="1.0" encoding="utf-8"?>
+<file path=ppt/slides/slide13.xml><?xml version="1.0" encoding="utf-8"?>
 <p:sld xmlns:a="http://schemas.openxmlformats.org/drawingml/2006/main" xmlns:r="http://schemas.openxmlformats.org/officeDocument/2006/relationships" xmlns:p="http://schemas.openxmlformats.org/presentationml/2006/main">
   <p:cSld>
     <p:spTree>
@@ -17508,7 +18038,7 @@
 </p:sld>
 </file>
 
-<file path=ppt/slides/slide12.xml><?xml version="1.0" encoding="utf-8"?>
+<file path=ppt/slides/slide14.xml><?xml version="1.0" encoding="utf-8"?>
 <p:sld xmlns:a="http://schemas.openxmlformats.org/drawingml/2006/main" xmlns:r="http://schemas.openxmlformats.org/officeDocument/2006/relationships" xmlns:p="http://schemas.openxmlformats.org/presentationml/2006/main">
   <p:cSld>
     <p:spTree>
@@ -17749,7 +18279,7 @@
 </p:sld>
 </file>
 
-<file path=ppt/slides/slide13.xml><?xml version="1.0" encoding="utf-8"?>
+<file path=ppt/slides/slide15.xml><?xml version="1.0" encoding="utf-8"?>
 <p:sld xmlns:a="http://schemas.openxmlformats.org/drawingml/2006/main" xmlns:r="http://schemas.openxmlformats.org/officeDocument/2006/relationships" xmlns:p="http://schemas.openxmlformats.org/presentationml/2006/main">
   <p:cSld>
     <p:bg>
@@ -20661,6 +21191,526 @@
         <p:cNvPr id="1" name="Shape 90">
           <a:extLst>
             <a:ext uri="{FF2B5EF4-FFF2-40B4-BE49-F238E27FC236}">
+              <a16:creationId xmlns:a16="http://schemas.microsoft.com/office/drawing/2014/main" id="{3A2EA1A9-B5AD-8733-FE79-FB5BA0A9A5A1}"/>
+            </a:ext>
+          </a:extLst>
+        </p:cNvPr>
+        <p:cNvGrpSpPr/>
+        <p:nvPr/>
+      </p:nvGrpSpPr>
+      <p:grpSpPr>
+        <a:xfrm>
+          <a:off x="0" y="0"/>
+          <a:ext cx="0" cy="0"/>
+          <a:chOff x="0" y="0"/>
+          <a:chExt cx="0" cy="0"/>
+        </a:xfrm>
+      </p:grpSpPr>
+      <p:pic>
+        <p:nvPicPr>
+          <p:cNvPr id="92" name="Google Shape;92;p2">
+            <a:extLst>
+              <a:ext uri="{FF2B5EF4-FFF2-40B4-BE49-F238E27FC236}">
+                <a16:creationId xmlns:a16="http://schemas.microsoft.com/office/drawing/2014/main" id="{BA728044-A965-6719-AA76-E03EA8AA2D89}"/>
+              </a:ext>
+            </a:extLst>
+          </p:cNvPr>
+          <p:cNvPicPr preferRelativeResize="0"/>
+          <p:nvPr/>
+        </p:nvPicPr>
+        <p:blipFill rotWithShape="1">
+          <a:blip r:embed="rId3">
+            <a:alphaModFix/>
+          </a:blip>
+          <a:srcRect/>
+          <a:stretch/>
+        </p:blipFill>
+        <p:spPr>
+          <a:xfrm>
+            <a:off x="0" y="0"/>
+            <a:ext cx="12313325" cy="1255521"/>
+          </a:xfrm>
+          <a:prstGeom prst="rect">
+            <a:avLst/>
+          </a:prstGeom>
+          <a:noFill/>
+          <a:ln>
+            <a:noFill/>
+          </a:ln>
+        </p:spPr>
+      </p:pic>
+      <p:sp>
+        <p:nvSpPr>
+          <p:cNvPr id="4" name="Title 1">
+            <a:extLst>
+              <a:ext uri="{FF2B5EF4-FFF2-40B4-BE49-F238E27FC236}">
+                <a16:creationId xmlns:a16="http://schemas.microsoft.com/office/drawing/2014/main" id="{92EFA269-CC08-6A79-E748-A94C5494E26D}"/>
+              </a:ext>
+            </a:extLst>
+          </p:cNvPr>
+          <p:cNvSpPr txBox="1">
+            <a:spLocks/>
+          </p:cNvSpPr>
+          <p:nvPr/>
+        </p:nvSpPr>
+        <p:spPr>
+          <a:xfrm>
+            <a:off x="727363" y="1255521"/>
+            <a:ext cx="4296921" cy="809253"/>
+          </a:xfrm>
+          <a:prstGeom prst="rect">
+            <a:avLst/>
+          </a:prstGeom>
+          <a:noFill/>
+          <a:ln>
+            <a:noFill/>
+          </a:ln>
+        </p:spPr>
+        <p:txBody>
+          <a:bodyPr spcFirstLastPara="1" wrap="square" lIns="91425" tIns="45700" rIns="91425" bIns="45700" anchor="t" anchorCtr="0">
+            <a:normAutofit/>
+          </a:bodyPr>
+          <a:lstStyle>
+            <a:defPPr marR="0" lvl="0" algn="l" rtl="0">
+              <a:lnSpc>
+                <a:spcPct val="100000"/>
+              </a:lnSpc>
+              <a:spcBef>
+                <a:spcPts val="0"/>
+              </a:spcBef>
+              <a:spcAft>
+                <a:spcPts val="0"/>
+              </a:spcAft>
+            </a:defPPr>
+            <a:lvl1pPr marR="0" lvl="0" algn="l" rtl="0">
+              <a:lnSpc>
+                <a:spcPct val="90000"/>
+              </a:lnSpc>
+              <a:spcBef>
+                <a:spcPts val="0"/>
+              </a:spcBef>
+              <a:spcAft>
+                <a:spcPts val="0"/>
+              </a:spcAft>
+              <a:buClr>
+                <a:schemeClr val="dk1"/>
+              </a:buClr>
+              <a:buSzPts val="1800"/>
+              <a:buFont typeface="Calibri"/>
+              <a:buNone/>
+              <a:defRPr sz="4400" b="0" i="0" u="none" strike="noStrike" cap="none">
+                <a:solidFill>
+                  <a:schemeClr val="dk1"/>
+                </a:solidFill>
+                <a:latin typeface="Calibri"/>
+                <a:ea typeface="Calibri"/>
+                <a:cs typeface="Calibri"/>
+                <a:sym typeface="Calibri"/>
+              </a:defRPr>
+            </a:lvl1pPr>
+            <a:lvl2pPr marR="0" lvl="1" algn="l" rtl="0">
+              <a:lnSpc>
+                <a:spcPct val="100000"/>
+              </a:lnSpc>
+              <a:spcBef>
+                <a:spcPts val="0"/>
+              </a:spcBef>
+              <a:spcAft>
+                <a:spcPts val="0"/>
+              </a:spcAft>
+              <a:buClr>
+                <a:srgbClr val="000000"/>
+              </a:buClr>
+              <a:buSzPts val="1400"/>
+              <a:buFont typeface="Arial"/>
+              <a:buNone/>
+              <a:defRPr sz="1800" b="0" i="0" u="none" strike="noStrike" cap="none">
+                <a:solidFill>
+                  <a:srgbClr val="000000"/>
+                </a:solidFill>
+                <a:latin typeface="Arial"/>
+                <a:ea typeface="Arial"/>
+                <a:cs typeface="Arial"/>
+                <a:sym typeface="Arial"/>
+              </a:defRPr>
+            </a:lvl2pPr>
+            <a:lvl3pPr marR="0" lvl="2" algn="l" rtl="0">
+              <a:lnSpc>
+                <a:spcPct val="100000"/>
+              </a:lnSpc>
+              <a:spcBef>
+                <a:spcPts val="0"/>
+              </a:spcBef>
+              <a:spcAft>
+                <a:spcPts val="0"/>
+              </a:spcAft>
+              <a:buClr>
+                <a:srgbClr val="000000"/>
+              </a:buClr>
+              <a:buSzPts val="1400"/>
+              <a:buFont typeface="Arial"/>
+              <a:buNone/>
+              <a:defRPr sz="1800" b="0" i="0" u="none" strike="noStrike" cap="none">
+                <a:solidFill>
+                  <a:srgbClr val="000000"/>
+                </a:solidFill>
+                <a:latin typeface="Arial"/>
+                <a:ea typeface="Arial"/>
+                <a:cs typeface="Arial"/>
+                <a:sym typeface="Arial"/>
+              </a:defRPr>
+            </a:lvl3pPr>
+            <a:lvl4pPr marR="0" lvl="3" algn="l" rtl="0">
+              <a:lnSpc>
+                <a:spcPct val="100000"/>
+              </a:lnSpc>
+              <a:spcBef>
+                <a:spcPts val="0"/>
+              </a:spcBef>
+              <a:spcAft>
+                <a:spcPts val="0"/>
+              </a:spcAft>
+              <a:buClr>
+                <a:srgbClr val="000000"/>
+              </a:buClr>
+              <a:buSzPts val="1400"/>
+              <a:buFont typeface="Arial"/>
+              <a:buNone/>
+              <a:defRPr sz="1800" b="0" i="0" u="none" strike="noStrike" cap="none">
+                <a:solidFill>
+                  <a:srgbClr val="000000"/>
+                </a:solidFill>
+                <a:latin typeface="Arial"/>
+                <a:ea typeface="Arial"/>
+                <a:cs typeface="Arial"/>
+                <a:sym typeface="Arial"/>
+              </a:defRPr>
+            </a:lvl4pPr>
+            <a:lvl5pPr marR="0" lvl="4" algn="l" rtl="0">
+              <a:lnSpc>
+                <a:spcPct val="100000"/>
+              </a:lnSpc>
+              <a:spcBef>
+                <a:spcPts val="0"/>
+              </a:spcBef>
+              <a:spcAft>
+                <a:spcPts val="0"/>
+              </a:spcAft>
+              <a:buClr>
+                <a:srgbClr val="000000"/>
+              </a:buClr>
+              <a:buSzPts val="1400"/>
+              <a:buFont typeface="Arial"/>
+              <a:buNone/>
+              <a:defRPr sz="1800" b="0" i="0" u="none" strike="noStrike" cap="none">
+                <a:solidFill>
+                  <a:srgbClr val="000000"/>
+                </a:solidFill>
+                <a:latin typeface="Arial"/>
+                <a:ea typeface="Arial"/>
+                <a:cs typeface="Arial"/>
+                <a:sym typeface="Arial"/>
+              </a:defRPr>
+            </a:lvl5pPr>
+            <a:lvl6pPr marR="0" lvl="5" algn="l" rtl="0">
+              <a:lnSpc>
+                <a:spcPct val="100000"/>
+              </a:lnSpc>
+              <a:spcBef>
+                <a:spcPts val="0"/>
+              </a:spcBef>
+              <a:spcAft>
+                <a:spcPts val="0"/>
+              </a:spcAft>
+              <a:buClr>
+                <a:srgbClr val="000000"/>
+              </a:buClr>
+              <a:buSzPts val="1400"/>
+              <a:buFont typeface="Arial"/>
+              <a:buNone/>
+              <a:defRPr sz="1800" b="0" i="0" u="none" strike="noStrike" cap="none">
+                <a:solidFill>
+                  <a:srgbClr val="000000"/>
+                </a:solidFill>
+                <a:latin typeface="Arial"/>
+                <a:ea typeface="Arial"/>
+                <a:cs typeface="Arial"/>
+                <a:sym typeface="Arial"/>
+              </a:defRPr>
+            </a:lvl6pPr>
+            <a:lvl7pPr marR="0" lvl="6" algn="l" rtl="0">
+              <a:lnSpc>
+                <a:spcPct val="100000"/>
+              </a:lnSpc>
+              <a:spcBef>
+                <a:spcPts val="0"/>
+              </a:spcBef>
+              <a:spcAft>
+                <a:spcPts val="0"/>
+              </a:spcAft>
+              <a:buClr>
+                <a:srgbClr val="000000"/>
+              </a:buClr>
+              <a:buSzPts val="1400"/>
+              <a:buFont typeface="Arial"/>
+              <a:buNone/>
+              <a:defRPr sz="1800" b="0" i="0" u="none" strike="noStrike" cap="none">
+                <a:solidFill>
+                  <a:srgbClr val="000000"/>
+                </a:solidFill>
+                <a:latin typeface="Arial"/>
+                <a:ea typeface="Arial"/>
+                <a:cs typeface="Arial"/>
+                <a:sym typeface="Arial"/>
+              </a:defRPr>
+            </a:lvl7pPr>
+            <a:lvl8pPr marR="0" lvl="7" algn="l" rtl="0">
+              <a:lnSpc>
+                <a:spcPct val="100000"/>
+              </a:lnSpc>
+              <a:spcBef>
+                <a:spcPts val="0"/>
+              </a:spcBef>
+              <a:spcAft>
+                <a:spcPts val="0"/>
+              </a:spcAft>
+              <a:buClr>
+                <a:srgbClr val="000000"/>
+              </a:buClr>
+              <a:buSzPts val="1400"/>
+              <a:buFont typeface="Arial"/>
+              <a:buNone/>
+              <a:defRPr sz="1800" b="0" i="0" u="none" strike="noStrike" cap="none">
+                <a:solidFill>
+                  <a:srgbClr val="000000"/>
+                </a:solidFill>
+                <a:latin typeface="Arial"/>
+                <a:ea typeface="Arial"/>
+                <a:cs typeface="Arial"/>
+                <a:sym typeface="Arial"/>
+              </a:defRPr>
+            </a:lvl8pPr>
+            <a:lvl9pPr marR="0" lvl="8" algn="l" rtl="0">
+              <a:lnSpc>
+                <a:spcPct val="100000"/>
+              </a:lnSpc>
+              <a:spcBef>
+                <a:spcPts val="0"/>
+              </a:spcBef>
+              <a:spcAft>
+                <a:spcPts val="0"/>
+              </a:spcAft>
+              <a:buClr>
+                <a:srgbClr val="000000"/>
+              </a:buClr>
+              <a:buSzPts val="1400"/>
+              <a:buFont typeface="Arial"/>
+              <a:buNone/>
+              <a:defRPr sz="1800" b="0" i="0" u="none" strike="noStrike" cap="none">
+                <a:solidFill>
+                  <a:srgbClr val="000000"/>
+                </a:solidFill>
+                <a:latin typeface="Arial"/>
+                <a:ea typeface="Arial"/>
+                <a:cs typeface="Arial"/>
+                <a:sym typeface="Arial"/>
+              </a:defRPr>
+            </a:lvl9pPr>
+          </a:lstStyle>
+          <a:p>
+            <a:pPr>
+              <a:lnSpc>
+                <a:spcPct val="150000"/>
+              </a:lnSpc>
+            </a:pPr>
+            <a:r>
+              <a:rPr lang="en-US" sz="2600" b="1">
+                <a:latin typeface="Times New Roman" panose="02020603050405020304" pitchFamily="18" charset="0"/>
+                <a:cs typeface="Times New Roman" panose="02020603050405020304" pitchFamily="18" charset="0"/>
+              </a:rPr>
+              <a:t>2.2. Mô hình DistilBERT</a:t>
+            </a:r>
+          </a:p>
+        </p:txBody>
+      </p:sp>
+      <p:pic>
+        <p:nvPicPr>
+          <p:cNvPr id="1028" name="Picture 4" descr="DistilBERT Architecture">
+            <a:extLst>
+              <a:ext uri="{FF2B5EF4-FFF2-40B4-BE49-F238E27FC236}">
+                <a16:creationId xmlns:a16="http://schemas.microsoft.com/office/drawing/2014/main" id="{EE63DCD2-5471-D5DF-E93A-613715439B2A}"/>
+              </a:ext>
+            </a:extLst>
+          </p:cNvPr>
+          <p:cNvPicPr>
+            <a:picLocks noChangeAspect="1" noChangeArrowheads="1"/>
+          </p:cNvPicPr>
+          <p:nvPr/>
+        </p:nvPicPr>
+        <p:blipFill>
+          <a:blip r:embed="rId4">
+            <a:extLst>
+              <a:ext uri="{28A0092B-C50C-407E-A947-70E740481C1C}">
+                <a14:useLocalDpi xmlns:a14="http://schemas.microsoft.com/office/drawing/2010/main" val="0"/>
+              </a:ext>
+            </a:extLst>
+          </a:blip>
+          <a:srcRect/>
+          <a:stretch>
+            <a:fillRect/>
+          </a:stretch>
+        </p:blipFill>
+        <p:spPr bwMode="auto">
+          <a:xfrm>
+            <a:off x="354114" y="1816664"/>
+            <a:ext cx="8111459" cy="3585000"/>
+          </a:xfrm>
+          <a:prstGeom prst="rect">
+            <a:avLst/>
+          </a:prstGeom>
+          <a:noFill/>
+          <a:extLst>
+            <a:ext uri="{909E8E84-426E-40DD-AFC4-6F175D3DCCD1}">
+              <a14:hiddenFill xmlns:a14="http://schemas.microsoft.com/office/drawing/2010/main">
+                <a:solidFill>
+                  <a:srgbClr val="FFFFFF"/>
+                </a:solidFill>
+              </a14:hiddenFill>
+            </a:ext>
+          </a:extLst>
+        </p:spPr>
+      </p:pic>
+      <p:sp>
+        <p:nvSpPr>
+          <p:cNvPr id="3" name="TextBox 2">
+            <a:extLst>
+              <a:ext uri="{FF2B5EF4-FFF2-40B4-BE49-F238E27FC236}">
+                <a16:creationId xmlns:a16="http://schemas.microsoft.com/office/drawing/2014/main" id="{BFD265B9-5C30-94E2-E253-68AA39358CEE}"/>
+              </a:ext>
+            </a:extLst>
+          </p:cNvPr>
+          <p:cNvSpPr txBox="1"/>
+          <p:nvPr/>
+        </p:nvSpPr>
+        <p:spPr>
+          <a:xfrm>
+            <a:off x="8308258" y="2064774"/>
+            <a:ext cx="3529628" cy="4524315"/>
+          </a:xfrm>
+          <a:prstGeom prst="rect">
+            <a:avLst/>
+          </a:prstGeom>
+          <a:noFill/>
+        </p:spPr>
+        <p:txBody>
+          <a:bodyPr wrap="square">
+            <a:spAutoFit/>
+          </a:bodyPr>
+          <a:lstStyle/>
+          <a:p>
+            <a:r>
+              <a:rPr lang="en-US" sz="2400" b="1">
+                <a:latin typeface="Times New Roman" panose="02020603050405020304" pitchFamily="18" charset="0"/>
+                <a:cs typeface="Times New Roman" panose="02020603050405020304" pitchFamily="18" charset="0"/>
+              </a:rPr>
+              <a:t>Pre-training (Tiền huấn luyện)</a:t>
+            </a:r>
+          </a:p>
+          <a:p>
+            <a:r>
+              <a:rPr lang="en-US" sz="2400">
+                <a:latin typeface="Times New Roman" panose="02020603050405020304" pitchFamily="18" charset="0"/>
+                <a:cs typeface="Times New Roman" panose="02020603050405020304" pitchFamily="18" charset="0"/>
+              </a:rPr>
+              <a:t>→ Mô hình học từ cặp câu A và B với nhiệm vụ dự đoán từ bị che (Masked LM).</a:t>
+            </a:r>
+          </a:p>
+          <a:p>
+            <a:endParaRPr lang="en-US" sz="2400">
+              <a:latin typeface="Times New Roman" panose="02020603050405020304" pitchFamily="18" charset="0"/>
+              <a:cs typeface="Times New Roman" panose="02020603050405020304" pitchFamily="18" charset="0"/>
+            </a:endParaRPr>
+          </a:p>
+          <a:p>
+            <a:r>
+              <a:rPr lang="en-US" sz="2400" b="1">
+                <a:latin typeface="Times New Roman" panose="02020603050405020304" pitchFamily="18" charset="0"/>
+                <a:cs typeface="Times New Roman" panose="02020603050405020304" pitchFamily="18" charset="0"/>
+              </a:rPr>
+              <a:t>Fine-tuning (Tinh chỉnh)</a:t>
+            </a:r>
+          </a:p>
+          <a:p>
+            <a:r>
+              <a:rPr lang="en-US" sz="2400">
+                <a:latin typeface="Times New Roman" panose="02020603050405020304" pitchFamily="18" charset="0"/>
+                <a:cs typeface="Times New Roman" panose="02020603050405020304" pitchFamily="18" charset="0"/>
+              </a:rPr>
+              <a:t>→ BERT được điều chỉnh cho tác vụ cụ thể như hỏi – đáp (xác định vị trí bắt đầu/kết thúc câu trả lời).</a:t>
+            </a:r>
+          </a:p>
+        </p:txBody>
+      </p:sp>
+      <p:sp>
+        <p:nvSpPr>
+          <p:cNvPr id="6" name="TextBox 5">
+            <a:extLst>
+              <a:ext uri="{FF2B5EF4-FFF2-40B4-BE49-F238E27FC236}">
+                <a16:creationId xmlns:a16="http://schemas.microsoft.com/office/drawing/2014/main" id="{C5E992EE-4181-2921-2100-F70CE407B413}"/>
+              </a:ext>
+            </a:extLst>
+          </p:cNvPr>
+          <p:cNvSpPr txBox="1"/>
+          <p:nvPr/>
+        </p:nvSpPr>
+        <p:spPr>
+          <a:xfrm>
+            <a:off x="1332347" y="5340869"/>
+            <a:ext cx="6154992" cy="523220"/>
+          </a:xfrm>
+          <a:prstGeom prst="rect">
+            <a:avLst/>
+          </a:prstGeom>
+          <a:noFill/>
+        </p:spPr>
+        <p:txBody>
+          <a:bodyPr wrap="square">
+            <a:spAutoFit/>
+          </a:bodyPr>
+          <a:lstStyle/>
+          <a:p>
+            <a:pPr algn="ctr"/>
+            <a:r>
+              <a:rPr lang="en-US" i="1">
+                <a:latin typeface="Times New Roman" panose="02020603050405020304" pitchFamily="18" charset="0"/>
+                <a:cs typeface="Times New Roman" panose="02020603050405020304" pitchFamily="18" charset="0"/>
+              </a:rPr>
+              <a:t>Hình minh họa quy trình huấn luyện của DistilBERT dựa trên kiến trúc BERT gồm hai giai đoạn: tiền huấn luyện và tinh chỉnh.</a:t>
+            </a:r>
+          </a:p>
+        </p:txBody>
+      </p:sp>
+    </p:spTree>
+    <p:extLst>
+      <p:ext uri="{BB962C8B-B14F-4D97-AF65-F5344CB8AC3E}">
+        <p14:creationId xmlns:p14="http://schemas.microsoft.com/office/powerpoint/2010/main" val="4053831185"/>
+      </p:ext>
+    </p:extLst>
+  </p:cSld>
+  <p:clrMapOvr>
+    <a:masterClrMapping/>
+  </p:clrMapOvr>
+</p:sld>
+</file>
+
+<file path=ppt/slides/slide7.xml><?xml version="1.0" encoding="utf-8"?>
+<p:sld xmlns:a="http://schemas.openxmlformats.org/drawingml/2006/main" xmlns:r="http://schemas.openxmlformats.org/officeDocument/2006/relationships" xmlns:p="http://schemas.openxmlformats.org/presentationml/2006/main">
+  <p:cSld>
+    <p:spTree>
+      <p:nvGrpSpPr>
+        <p:cNvPr id="1" name="Shape 90">
+          <a:extLst>
+            <a:ext uri="{FF2B5EF4-FFF2-40B4-BE49-F238E27FC236}">
               <a16:creationId xmlns:a16="http://schemas.microsoft.com/office/drawing/2014/main" id="{F3669590-10D5-47D2-DA82-06A0DB4E6200}"/>
             </a:ext>
           </a:extLst>
@@ -21131,7 +22181,7 @@
 </p:sld>
 </file>
 
-<file path=ppt/slides/slide7.xml><?xml version="1.0" encoding="utf-8"?>
+<file path=ppt/slides/slide8.xml><?xml version="1.0" encoding="utf-8"?>
 <p:sld xmlns:a="http://schemas.openxmlformats.org/drawingml/2006/main" xmlns:r="http://schemas.openxmlformats.org/officeDocument/2006/relationships" xmlns:p="http://schemas.openxmlformats.org/presentationml/2006/main">
   <p:cSld>
     <p:spTree>
@@ -21557,7 +22607,7 @@
 </p:sld>
 </file>
 
-<file path=ppt/slides/slide8.xml><?xml version="1.0" encoding="utf-8"?>
+<file path=ppt/slides/slide9.xml><?xml version="1.0" encoding="utf-8"?>
 <p:sld xmlns:a="http://schemas.openxmlformats.org/drawingml/2006/main" xmlns:r="http://schemas.openxmlformats.org/officeDocument/2006/relationships" xmlns:p="http://schemas.openxmlformats.org/presentationml/2006/main">
   <p:cSld>
     <p:spTree>
@@ -21936,143 +22986,6 @@
     <p:extLst>
       <p:ext uri="{BB962C8B-B14F-4D97-AF65-F5344CB8AC3E}">
         <p14:creationId xmlns:p14="http://schemas.microsoft.com/office/powerpoint/2010/main" val="1545342156"/>
-      </p:ext>
-    </p:extLst>
-  </p:cSld>
-  <p:clrMapOvr>
-    <a:masterClrMapping/>
-  </p:clrMapOvr>
-</p:sld>
-</file>
-
-<file path=ppt/slides/slide9.xml><?xml version="1.0" encoding="utf-8"?>
-<p:sld xmlns:a="http://schemas.openxmlformats.org/drawingml/2006/main" xmlns:r="http://schemas.openxmlformats.org/officeDocument/2006/relationships" xmlns:p="http://schemas.openxmlformats.org/presentationml/2006/main">
-  <p:cSld>
-    <p:spTree>
-      <p:nvGrpSpPr>
-        <p:cNvPr id="1" name="Shape 90">
-          <a:extLst>
-            <a:ext uri="{FF2B5EF4-FFF2-40B4-BE49-F238E27FC236}">
-              <a16:creationId xmlns:a16="http://schemas.microsoft.com/office/drawing/2014/main" id="{96933A31-685C-6947-68BE-E02DA179DB8D}"/>
-            </a:ext>
-          </a:extLst>
-        </p:cNvPr>
-        <p:cNvGrpSpPr/>
-        <p:nvPr/>
-      </p:nvGrpSpPr>
-      <p:grpSpPr>
-        <a:xfrm>
-          <a:off x="0" y="0"/>
-          <a:ext cx="0" cy="0"/>
-          <a:chOff x="0" y="0"/>
-          <a:chExt cx="0" cy="0"/>
-        </a:xfrm>
-      </p:grpSpPr>
-      <p:pic>
-        <p:nvPicPr>
-          <p:cNvPr id="92" name="Google Shape;92;p2">
-            <a:extLst>
-              <a:ext uri="{FF2B5EF4-FFF2-40B4-BE49-F238E27FC236}">
-                <a16:creationId xmlns:a16="http://schemas.microsoft.com/office/drawing/2014/main" id="{211A6BC1-5286-C164-D32F-8A1604AF5302}"/>
-              </a:ext>
-            </a:extLst>
-          </p:cNvPr>
-          <p:cNvPicPr preferRelativeResize="0"/>
-          <p:nvPr/>
-        </p:nvPicPr>
-        <p:blipFill rotWithShape="1">
-          <a:blip r:embed="rId3">
-            <a:alphaModFix/>
-          </a:blip>
-          <a:srcRect/>
-          <a:stretch/>
-        </p:blipFill>
-        <p:spPr>
-          <a:xfrm>
-            <a:off x="0" y="0"/>
-            <a:ext cx="12313325" cy="1255521"/>
-          </a:xfrm>
-          <a:prstGeom prst="rect">
-            <a:avLst/>
-          </a:prstGeom>
-          <a:noFill/>
-          <a:ln>
-            <a:noFill/>
-          </a:ln>
-        </p:spPr>
-      </p:pic>
-      <p:sp>
-        <p:nvSpPr>
-          <p:cNvPr id="3" name="Title 1">
-            <a:extLst>
-              <a:ext uri="{FF2B5EF4-FFF2-40B4-BE49-F238E27FC236}">
-                <a16:creationId xmlns:a16="http://schemas.microsoft.com/office/drawing/2014/main" id="{489EBB6A-0E4C-2649-9615-F84EEC44E65C}"/>
-              </a:ext>
-            </a:extLst>
-          </p:cNvPr>
-          <p:cNvSpPr>
-            <a:spLocks noGrp="1"/>
-          </p:cNvSpPr>
-          <p:nvPr>
-            <p:ph type="title"/>
-          </p:nvPr>
-        </p:nvSpPr>
-        <p:spPr>
-          <a:xfrm>
-            <a:off x="370839" y="1446908"/>
-            <a:ext cx="10515600" cy="552014"/>
-          </a:xfrm>
-        </p:spPr>
-        <p:txBody>
-          <a:bodyPr>
-            <a:normAutofit/>
-          </a:bodyPr>
-          <a:lstStyle/>
-          <a:p>
-            <a:r>
-              <a:rPr lang="en-US" sz="2400" b="1">
-                <a:latin typeface="Times New Roman" panose="02020603050405020304" pitchFamily="18" charset="0"/>
-                <a:cs typeface="Times New Roman" panose="02020603050405020304" pitchFamily="18" charset="0"/>
-              </a:rPr>
-              <a:t>4. Demo</a:t>
-            </a:r>
-          </a:p>
-        </p:txBody>
-      </p:sp>
-      <p:pic>
-        <p:nvPicPr>
-          <p:cNvPr id="4" name="Picture 3">
-            <a:extLst>
-              <a:ext uri="{FF2B5EF4-FFF2-40B4-BE49-F238E27FC236}">
-                <a16:creationId xmlns:a16="http://schemas.microsoft.com/office/drawing/2014/main" id="{EB3EF2C5-595A-A6A8-2F6F-2B0EB4D227EB}"/>
-              </a:ext>
-            </a:extLst>
-          </p:cNvPr>
-          <p:cNvPicPr>
-            <a:picLocks noChangeAspect="1"/>
-          </p:cNvPicPr>
-          <p:nvPr/>
-        </p:nvPicPr>
-        <p:blipFill>
-          <a:blip r:embed="rId4"/>
-          <a:stretch>
-            <a:fillRect/>
-          </a:stretch>
-        </p:blipFill>
-        <p:spPr>
-          <a:xfrm>
-            <a:off x="3215188" y="1616152"/>
-            <a:ext cx="5184533" cy="4894517"/>
-          </a:xfrm>
-          <a:prstGeom prst="rect">
-            <a:avLst/>
-          </a:prstGeom>
-        </p:spPr>
-      </p:pic>
-    </p:spTree>
-    <p:extLst>
-      <p:ext uri="{BB962C8B-B14F-4D97-AF65-F5344CB8AC3E}">
-        <p14:creationId xmlns:p14="http://schemas.microsoft.com/office/powerpoint/2010/main" val="1207278348"/>
       </p:ext>
     </p:extLst>
   </p:cSld>

</xml_diff>